<commit_message>
re-gen results for poster
</commit_message>
<xml_diff>
--- a/FreeView_Paper/Diagrams/Paradigm diagram.pptx
+++ b/FreeView_Paper/Diagrams/Paradigm diagram.pptx
@@ -104,6 +104,11 @@
       </a:defRPr>
     </a:lvl9pPr>
   </p:defaultTextStyle>
+  <p:extLst>
+    <p:ext uri="{EFAFB233-063F-42B5-8137-9DF3F51BA10A}">
+      <p15:sldGuideLst xmlns:p15="http://schemas.microsoft.com/office/powerpoint/2012/main"/>
+    </p:ext>
+  </p:extLst>
 </p:presentation>
 </file>
 
@@ -254,7 +259,7 @@
           <a:p>
             <a:fld id="{2D2B8443-A1E5-44A2-A660-E13A8B3B6EF7}" type="datetimeFigureOut">
               <a:rPr lang="zh-CN" altLang="en-US" smtClean="0"/>
-              <a:t>2025/11/21</a:t>
+              <a:t>2026/2/4</a:t>
             </a:fld>
             <a:endParaRPr lang="zh-CN" altLang="en-US"/>
           </a:p>
@@ -452,7 +457,7 @@
           <a:p>
             <a:fld id="{2D2B8443-A1E5-44A2-A660-E13A8B3B6EF7}" type="datetimeFigureOut">
               <a:rPr lang="zh-CN" altLang="en-US" smtClean="0"/>
-              <a:t>2025/11/21</a:t>
+              <a:t>2026/2/4</a:t>
             </a:fld>
             <a:endParaRPr lang="zh-CN" altLang="en-US"/>
           </a:p>
@@ -660,7 +665,7 @@
           <a:p>
             <a:fld id="{2D2B8443-A1E5-44A2-A660-E13A8B3B6EF7}" type="datetimeFigureOut">
               <a:rPr lang="zh-CN" altLang="en-US" smtClean="0"/>
-              <a:t>2025/11/21</a:t>
+              <a:t>2026/2/4</a:t>
             </a:fld>
             <a:endParaRPr lang="zh-CN" altLang="en-US"/>
           </a:p>
@@ -858,7 +863,7 @@
           <a:p>
             <a:fld id="{2D2B8443-A1E5-44A2-A660-E13A8B3B6EF7}" type="datetimeFigureOut">
               <a:rPr lang="zh-CN" altLang="en-US" smtClean="0"/>
-              <a:t>2025/11/21</a:t>
+              <a:t>2026/2/4</a:t>
             </a:fld>
             <a:endParaRPr lang="zh-CN" altLang="en-US"/>
           </a:p>
@@ -1133,7 +1138,7 @@
           <a:p>
             <a:fld id="{2D2B8443-A1E5-44A2-A660-E13A8B3B6EF7}" type="datetimeFigureOut">
               <a:rPr lang="zh-CN" altLang="en-US" smtClean="0"/>
-              <a:t>2025/11/21</a:t>
+              <a:t>2026/2/4</a:t>
             </a:fld>
             <a:endParaRPr lang="zh-CN" altLang="en-US"/>
           </a:p>
@@ -1398,7 +1403,7 @@
           <a:p>
             <a:fld id="{2D2B8443-A1E5-44A2-A660-E13A8B3B6EF7}" type="datetimeFigureOut">
               <a:rPr lang="zh-CN" altLang="en-US" smtClean="0"/>
-              <a:t>2025/11/21</a:t>
+              <a:t>2026/2/4</a:t>
             </a:fld>
             <a:endParaRPr lang="zh-CN" altLang="en-US"/>
           </a:p>
@@ -1810,7 +1815,7 @@
           <a:p>
             <a:fld id="{2D2B8443-A1E5-44A2-A660-E13A8B3B6EF7}" type="datetimeFigureOut">
               <a:rPr lang="zh-CN" altLang="en-US" smtClean="0"/>
-              <a:t>2025/11/21</a:t>
+              <a:t>2026/2/4</a:t>
             </a:fld>
             <a:endParaRPr lang="zh-CN" altLang="en-US"/>
           </a:p>
@@ -1951,7 +1956,7 @@
           <a:p>
             <a:fld id="{2D2B8443-A1E5-44A2-A660-E13A8B3B6EF7}" type="datetimeFigureOut">
               <a:rPr lang="zh-CN" altLang="en-US" smtClean="0"/>
-              <a:t>2025/11/21</a:t>
+              <a:t>2026/2/4</a:t>
             </a:fld>
             <a:endParaRPr lang="zh-CN" altLang="en-US"/>
           </a:p>
@@ -2064,7 +2069,7 @@
           <a:p>
             <a:fld id="{2D2B8443-A1E5-44A2-A660-E13A8B3B6EF7}" type="datetimeFigureOut">
               <a:rPr lang="zh-CN" altLang="en-US" smtClean="0"/>
-              <a:t>2025/11/21</a:t>
+              <a:t>2026/2/4</a:t>
             </a:fld>
             <a:endParaRPr lang="zh-CN" altLang="en-US"/>
           </a:p>
@@ -2375,7 +2380,7 @@
           <a:p>
             <a:fld id="{2D2B8443-A1E5-44A2-A660-E13A8B3B6EF7}" type="datetimeFigureOut">
               <a:rPr lang="zh-CN" altLang="en-US" smtClean="0"/>
-              <a:t>2025/11/21</a:t>
+              <a:t>2026/2/4</a:t>
             </a:fld>
             <a:endParaRPr lang="zh-CN" altLang="en-US"/>
           </a:p>
@@ -2663,7 +2668,7 @@
           <a:p>
             <a:fld id="{2D2B8443-A1E5-44A2-A660-E13A8B3B6EF7}" type="datetimeFigureOut">
               <a:rPr lang="zh-CN" altLang="en-US" smtClean="0"/>
-              <a:t>2025/11/21</a:t>
+              <a:t>2026/2/4</a:t>
             </a:fld>
             <a:endParaRPr lang="zh-CN" altLang="en-US"/>
           </a:p>
@@ -2904,7 +2909,7 @@
           <a:p>
             <a:fld id="{2D2B8443-A1E5-44A2-A660-E13A8B3B6EF7}" type="datetimeFigureOut">
               <a:rPr lang="zh-CN" altLang="en-US" smtClean="0"/>
-              <a:t>2025/11/21</a:t>
+              <a:t>2026/2/4</a:t>
             </a:fld>
             <a:endParaRPr lang="zh-CN" altLang="en-US"/>
           </a:p>

</xml_diff>